<commit_message>
update: Xong noi dung cho toan bo ban ve
</commit_message>
<xml_diff>
--- a/docs/final_project/ppt/main_ppt.pptx
+++ b/docs/final_project/ppt/main_ppt.pptx
@@ -7,6 +7,7 @@
   <p:sldIdLst>
     <p:sldId id="256" r:id="rId2"/>
     <p:sldId id="257" r:id="rId3"/>
+    <p:sldId id="258" r:id="rId4"/>
   </p:sldIdLst>
   <p:sldSz cx="12192000" cy="6858000"/>
   <p:notesSz cx="6858000" cy="9144000"/>
@@ -105,6 +106,11 @@
       </a:defRPr>
     </a:lvl9pPr>
   </p:defaultTextStyle>
+  <p:extLst>
+    <p:ext uri="{EFAFB233-063F-42B5-8137-9DF3F51BA10A}">
+      <p15:sldGuideLst xmlns:p15="http://schemas.microsoft.com/office/powerpoint/2012/main"/>
+    </p:ext>
+  </p:extLst>
 </p:presentation>
 </file>
 
@@ -278,7 +284,7 @@
           <a:p>
             <a:fld id="{9F8A621B-29C9-4236-9C3E-2BF53965995E}" type="datetimeFigureOut">
               <a:rPr lang="vi-VN" smtClean="0"/>
-              <a:t>04/07/2024</a:t>
+              <a:t>07/07/2024</a:t>
             </a:fld>
             <a:endParaRPr lang="vi-VN"/>
           </a:p>
@@ -545,7 +551,7 @@
           <a:p>
             <a:fld id="{9F8A621B-29C9-4236-9C3E-2BF53965995E}" type="datetimeFigureOut">
               <a:rPr lang="vi-VN" smtClean="0"/>
-              <a:t>04/07/2024</a:t>
+              <a:t>07/07/2024</a:t>
             </a:fld>
             <a:endParaRPr lang="vi-VN"/>
           </a:p>
@@ -776,7 +782,7 @@
           <a:p>
             <a:fld id="{9F8A621B-29C9-4236-9C3E-2BF53965995E}" type="datetimeFigureOut">
               <a:rPr lang="vi-VN" smtClean="0"/>
-              <a:t>04/07/2024</a:t>
+              <a:t>07/07/2024</a:t>
             </a:fld>
             <a:endParaRPr lang="vi-VN"/>
           </a:p>
@@ -1086,7 +1092,7 @@
           <a:p>
             <a:fld id="{9F8A621B-29C9-4236-9C3E-2BF53965995E}" type="datetimeFigureOut">
               <a:rPr lang="vi-VN" smtClean="0"/>
-              <a:t>04/07/2024</a:t>
+              <a:t>07/07/2024</a:t>
             </a:fld>
             <a:endParaRPr lang="vi-VN"/>
           </a:p>
@@ -1559,7 +1565,7 @@
           <a:p>
             <a:fld id="{9F8A621B-29C9-4236-9C3E-2BF53965995E}" type="datetimeFigureOut">
               <a:rPr lang="vi-VN" smtClean="0"/>
-              <a:t>04/07/2024</a:t>
+              <a:t>07/07/2024</a:t>
             </a:fld>
             <a:endParaRPr lang="vi-VN"/>
           </a:p>
@@ -2106,7 +2112,7 @@
           <a:p>
             <a:fld id="{9F8A621B-29C9-4236-9C3E-2BF53965995E}" type="datetimeFigureOut">
               <a:rPr lang="vi-VN" smtClean="0"/>
-              <a:t>04/07/2024</a:t>
+              <a:t>07/07/2024</a:t>
             </a:fld>
             <a:endParaRPr lang="vi-VN"/>
           </a:p>
@@ -2880,7 +2886,7 @@
           <a:p>
             <a:fld id="{9F8A621B-29C9-4236-9C3E-2BF53965995E}" type="datetimeFigureOut">
               <a:rPr lang="vi-VN" smtClean="0"/>
-              <a:t>04/07/2024</a:t>
+              <a:t>07/07/2024</a:t>
             </a:fld>
             <a:endParaRPr lang="vi-VN"/>
           </a:p>
@@ -3055,7 +3061,7 @@
           <a:p>
             <a:fld id="{9F8A621B-29C9-4236-9C3E-2BF53965995E}" type="datetimeFigureOut">
               <a:rPr lang="vi-VN" smtClean="0"/>
-              <a:t>04/07/2024</a:t>
+              <a:t>07/07/2024</a:t>
             </a:fld>
             <a:endParaRPr lang="vi-VN"/>
           </a:p>
@@ -3278,7 +3284,7 @@
           <a:p>
             <a:fld id="{9F8A621B-29C9-4236-9C3E-2BF53965995E}" type="datetimeFigureOut">
               <a:rPr lang="vi-VN" smtClean="0"/>
-              <a:t>04/07/2024</a:t>
+              <a:t>07/07/2024</a:t>
             </a:fld>
             <a:endParaRPr lang="vi-VN"/>
           </a:p>
@@ -3458,7 +3464,7 @@
           <a:p>
             <a:fld id="{9F8A621B-29C9-4236-9C3E-2BF53965995E}" type="datetimeFigureOut">
               <a:rPr lang="vi-VN" smtClean="0"/>
-              <a:t>04/07/2024</a:t>
+              <a:t>07/07/2024</a:t>
             </a:fld>
             <a:endParaRPr lang="vi-VN"/>
           </a:p>
@@ -3747,7 +3753,7 @@
           <a:p>
             <a:fld id="{9F8A621B-29C9-4236-9C3E-2BF53965995E}" type="datetimeFigureOut">
               <a:rPr lang="vi-VN" smtClean="0"/>
-              <a:t>04/07/2024</a:t>
+              <a:t>07/07/2024</a:t>
             </a:fld>
             <a:endParaRPr lang="vi-VN"/>
           </a:p>
@@ -3989,7 +3995,7 @@
           <a:p>
             <a:fld id="{9F8A621B-29C9-4236-9C3E-2BF53965995E}" type="datetimeFigureOut">
               <a:rPr lang="vi-VN" smtClean="0"/>
-              <a:t>04/07/2024</a:t>
+              <a:t>07/07/2024</a:t>
             </a:fld>
             <a:endParaRPr lang="vi-VN"/>
           </a:p>
@@ -4368,7 +4374,7 @@
           <a:p>
             <a:fld id="{9F8A621B-29C9-4236-9C3E-2BF53965995E}" type="datetimeFigureOut">
               <a:rPr lang="vi-VN" smtClean="0"/>
-              <a:t>04/07/2024</a:t>
+              <a:t>07/07/2024</a:t>
             </a:fld>
             <a:endParaRPr lang="vi-VN"/>
           </a:p>
@@ -4486,7 +4492,7 @@
           <a:p>
             <a:fld id="{9F8A621B-29C9-4236-9C3E-2BF53965995E}" type="datetimeFigureOut">
               <a:rPr lang="vi-VN" smtClean="0"/>
-              <a:t>04/07/2024</a:t>
+              <a:t>07/07/2024</a:t>
             </a:fld>
             <a:endParaRPr lang="vi-VN"/>
           </a:p>
@@ -4581,7 +4587,7 @@
           <a:p>
             <a:fld id="{9F8A621B-29C9-4236-9C3E-2BF53965995E}" type="datetimeFigureOut">
               <a:rPr lang="vi-VN" smtClean="0"/>
-              <a:t>04/07/2024</a:t>
+              <a:t>07/07/2024</a:t>
             </a:fld>
             <a:endParaRPr lang="vi-VN"/>
           </a:p>
@@ -4830,7 +4836,7 @@
           <a:p>
             <a:fld id="{9F8A621B-29C9-4236-9C3E-2BF53965995E}" type="datetimeFigureOut">
               <a:rPr lang="vi-VN" smtClean="0"/>
-              <a:t>04/07/2024</a:t>
+              <a:t>07/07/2024</a:t>
             </a:fld>
             <a:endParaRPr lang="vi-VN"/>
           </a:p>
@@ -5087,7 +5093,7 @@
           <a:p>
             <a:fld id="{9F8A621B-29C9-4236-9C3E-2BF53965995E}" type="datetimeFigureOut">
               <a:rPr lang="vi-VN" smtClean="0"/>
-              <a:t>04/07/2024</a:t>
+              <a:t>07/07/2024</a:t>
             </a:fld>
             <a:endParaRPr lang="vi-VN"/>
           </a:p>
@@ -5330,7 +5336,7 @@
           <a:p>
             <a:fld id="{9F8A621B-29C9-4236-9C3E-2BF53965995E}" type="datetimeFigureOut">
               <a:rPr lang="vi-VN" smtClean="0"/>
-              <a:t>04/07/2024</a:t>
+              <a:t>07/07/2024</a:t>
             </a:fld>
             <a:endParaRPr lang="vi-VN"/>
           </a:p>
@@ -6384,6 +6390,36 @@
 </p:sld>
 </file>
 
+<file path=ppt/slides/slide3.xml><?xml version="1.0" encoding="utf-8"?>
+<p:sld xmlns:a="http://schemas.openxmlformats.org/drawingml/2006/main" xmlns:r="http://schemas.openxmlformats.org/officeDocument/2006/relationships" xmlns:p="http://schemas.openxmlformats.org/presentationml/2006/main">
+  <p:cSld>
+    <p:spTree>
+      <p:nvGrpSpPr>
+        <p:cNvPr id="1" name=""/>
+        <p:cNvGrpSpPr/>
+        <p:nvPr/>
+      </p:nvGrpSpPr>
+      <p:grpSpPr>
+        <a:xfrm>
+          <a:off x="0" y="0"/>
+          <a:ext cx="0" cy="0"/>
+          <a:chOff x="0" y="0"/>
+          <a:chExt cx="0" cy="0"/>
+        </a:xfrm>
+      </p:grpSpPr>
+    </p:spTree>
+    <p:extLst>
+      <p:ext uri="{BB962C8B-B14F-4D97-AF65-F5344CB8AC3E}">
+        <p14:creationId xmlns:p14="http://schemas.microsoft.com/office/powerpoint/2010/main" val="3776009927"/>
+      </p:ext>
+    </p:extLst>
+  </p:cSld>
+  <p:clrMapOvr>
+    <a:masterClrMapping/>
+  </p:clrMapOvr>
+</p:sld>
+</file>
+
 <file path=ppt/theme/theme1.xml><?xml version="1.0" encoding="utf-8"?>
 <a:theme xmlns:a="http://schemas.openxmlformats.org/drawingml/2006/main" name="Vapor Trail">
   <a:themeElements>

</xml_diff>